<commit_message>
adding cout don and doc updates
</commit_message>
<xml_diff>
--- a/Docs/Project_Design.pptx
+++ b/Docs/Project_Design.pptx
@@ -199,7 +199,7 @@
           <a:p>
             <a:fld id="{6BA867CF-29AF-4007-B871-2358EEA38CED}" type="datetimeFigureOut">
               <a:rPr lang="en-US" smtClean="0"/>
-              <a:t>1/29/2021</a:t>
+              <a:t>2/1/2021</a:t>
             </a:fld>
             <a:endParaRPr lang="en-US"/>
           </a:p>
@@ -613,7 +613,7 @@
           <a:p>
             <a:fld id="{B8F5E894-B6CA-4E64-BEDD-9799844A929F}" type="datetimeFigureOut">
               <a:rPr lang="en-US" smtClean="0"/>
-              <a:t>1/29/2021</a:t>
+              <a:t>2/1/2021</a:t>
             </a:fld>
             <a:endParaRPr lang="en-US"/>
           </a:p>
@@ -811,7 +811,7 @@
           <a:p>
             <a:fld id="{B8F5E894-B6CA-4E64-BEDD-9799844A929F}" type="datetimeFigureOut">
               <a:rPr lang="en-US" smtClean="0"/>
-              <a:t>1/29/2021</a:t>
+              <a:t>2/1/2021</a:t>
             </a:fld>
             <a:endParaRPr lang="en-US"/>
           </a:p>
@@ -1019,7 +1019,7 @@
           <a:p>
             <a:fld id="{B8F5E894-B6CA-4E64-BEDD-9799844A929F}" type="datetimeFigureOut">
               <a:rPr lang="en-US" smtClean="0"/>
-              <a:t>1/29/2021</a:t>
+              <a:t>2/1/2021</a:t>
             </a:fld>
             <a:endParaRPr lang="en-US"/>
           </a:p>
@@ -1217,7 +1217,7 @@
           <a:p>
             <a:fld id="{B8F5E894-B6CA-4E64-BEDD-9799844A929F}" type="datetimeFigureOut">
               <a:rPr lang="en-US" smtClean="0"/>
-              <a:t>1/29/2021</a:t>
+              <a:t>2/1/2021</a:t>
             </a:fld>
             <a:endParaRPr lang="en-US"/>
           </a:p>
@@ -1492,7 +1492,7 @@
           <a:p>
             <a:fld id="{B8F5E894-B6CA-4E64-BEDD-9799844A929F}" type="datetimeFigureOut">
               <a:rPr lang="en-US" smtClean="0"/>
-              <a:t>1/29/2021</a:t>
+              <a:t>2/1/2021</a:t>
             </a:fld>
             <a:endParaRPr lang="en-US"/>
           </a:p>
@@ -1757,7 +1757,7 @@
           <a:p>
             <a:fld id="{B8F5E894-B6CA-4E64-BEDD-9799844A929F}" type="datetimeFigureOut">
               <a:rPr lang="en-US" smtClean="0"/>
-              <a:t>1/29/2021</a:t>
+              <a:t>2/1/2021</a:t>
             </a:fld>
             <a:endParaRPr lang="en-US"/>
           </a:p>
@@ -2169,7 +2169,7 @@
           <a:p>
             <a:fld id="{B8F5E894-B6CA-4E64-BEDD-9799844A929F}" type="datetimeFigureOut">
               <a:rPr lang="en-US" smtClean="0"/>
-              <a:t>1/29/2021</a:t>
+              <a:t>2/1/2021</a:t>
             </a:fld>
             <a:endParaRPr lang="en-US"/>
           </a:p>
@@ -2310,7 +2310,7 @@
           <a:p>
             <a:fld id="{B8F5E894-B6CA-4E64-BEDD-9799844A929F}" type="datetimeFigureOut">
               <a:rPr lang="en-US" smtClean="0"/>
-              <a:t>1/29/2021</a:t>
+              <a:t>2/1/2021</a:t>
             </a:fld>
             <a:endParaRPr lang="en-US"/>
           </a:p>
@@ -2423,7 +2423,7 @@
           <a:p>
             <a:fld id="{B8F5E894-B6CA-4E64-BEDD-9799844A929F}" type="datetimeFigureOut">
               <a:rPr lang="en-US" smtClean="0"/>
-              <a:t>1/29/2021</a:t>
+              <a:t>2/1/2021</a:t>
             </a:fld>
             <a:endParaRPr lang="en-US"/>
           </a:p>
@@ -2734,7 +2734,7 @@
           <a:p>
             <a:fld id="{B8F5E894-B6CA-4E64-BEDD-9799844A929F}" type="datetimeFigureOut">
               <a:rPr lang="en-US" smtClean="0"/>
-              <a:t>1/29/2021</a:t>
+              <a:t>2/1/2021</a:t>
             </a:fld>
             <a:endParaRPr lang="en-US"/>
           </a:p>
@@ -3022,7 +3022,7 @@
           <a:p>
             <a:fld id="{B8F5E894-B6CA-4E64-BEDD-9799844A929F}" type="datetimeFigureOut">
               <a:rPr lang="en-US" smtClean="0"/>
-              <a:t>1/29/2021</a:t>
+              <a:t>2/1/2021</a:t>
             </a:fld>
             <a:endParaRPr lang="en-US"/>
           </a:p>
@@ -3263,7 +3263,7 @@
           <a:p>
             <a:fld id="{B8F5E894-B6CA-4E64-BEDD-9799844A929F}" type="datetimeFigureOut">
               <a:rPr lang="en-US" smtClean="0"/>
-              <a:t>1/29/2021</a:t>
+              <a:t>2/1/2021</a:t>
             </a:fld>
             <a:endParaRPr lang="en-US"/>
           </a:p>
@@ -5077,23 +5077,7 @@
           <a:p>
             <a:r>
               <a:rPr lang="en-US" dirty="0"/>
-              <a:t>Model 1- using Message </a:t>
-            </a:r>
-            <a:r>
-              <a:rPr lang="en-US" dirty="0" err="1"/>
-              <a:t>brocker</a:t>
-            </a:r>
-            <a:r>
-              <a:rPr lang="en-US" dirty="0"/>
-              <a:t> </a:t>
-            </a:r>
-            <a:r>
-              <a:rPr lang="en-US" dirty="0" err="1"/>
-              <a:t>fot</a:t>
-            </a:r>
-            <a:r>
-              <a:rPr lang="en-US" dirty="0"/>
-              <a:t> notifications</a:t>
+              <a:t>Model 1- using Message broker for notifications</a:t>
             </a:r>
           </a:p>
         </p:txBody>

</xml_diff>